<commit_message>
Added a background slide
</commit_message>
<xml_diff>
--- a/bAGOLife.pptx
+++ b/bAGOLife.pptx
@@ -4,6 +4,9 @@
   <p:sldMasterIdLst>
     <p:sldMasterId id="2147483672" r:id="rId1"/>
   </p:sldMasterIdLst>
+  <p:notesMasterIdLst>
+    <p:notesMasterId r:id="rId8"/>
+  </p:notesMasterIdLst>
   <p:sldIdLst>
     <p:sldId id="256" r:id="rId2"/>
     <p:sldId id="257" r:id="rId3"/>
@@ -109,6 +112,11 @@
       </a:defRPr>
     </a:lvl9pPr>
   </p:defaultTextStyle>
+  <p:extLst>
+    <p:ext uri="{EFAFB233-063F-42B5-8137-9DF3F51BA10A}">
+      <p15:sldGuideLst xmlns:p15="http://schemas.microsoft.com/office/powerpoint/2012/main"/>
+    </p:ext>
+  </p:extLst>
 </p:presentation>
 </file>
 
@@ -174,6 +182,440 @@
     </pc:docChg>
   </pc:docChgLst>
 </pc:chgInfo>
+</file>
+
+<file path=ppt/notesMasters/notesMaster1.xml><?xml version="1.0" encoding="utf-8"?>
+<p:notesMaster xmlns:a="http://schemas.openxmlformats.org/drawingml/2006/main" xmlns:r="http://schemas.openxmlformats.org/officeDocument/2006/relationships" xmlns:p="http://schemas.openxmlformats.org/presentationml/2006/main">
+  <p:cSld>
+    <p:bg>
+      <p:bgRef idx="1001">
+        <a:schemeClr val="bg1"/>
+      </p:bgRef>
+    </p:bg>
+    <p:spTree>
+      <p:nvGrpSpPr>
+        <p:cNvPr id="1" name=""/>
+        <p:cNvGrpSpPr/>
+        <p:nvPr/>
+      </p:nvGrpSpPr>
+      <p:grpSpPr>
+        <a:xfrm>
+          <a:off x="0" y="0"/>
+          <a:ext cx="0" cy="0"/>
+          <a:chOff x="0" y="0"/>
+          <a:chExt cx="0" cy="0"/>
+        </a:xfrm>
+      </p:grpSpPr>
+      <p:sp>
+        <p:nvSpPr>
+          <p:cNvPr id="2" name="Header Placeholder 1"/>
+          <p:cNvSpPr>
+            <a:spLocks noGrp="1"/>
+          </p:cNvSpPr>
+          <p:nvPr>
+            <p:ph type="hdr" sz="quarter"/>
+          </p:nvPr>
+        </p:nvSpPr>
+        <p:spPr>
+          <a:xfrm>
+            <a:off x="0" y="0"/>
+            <a:ext cx="2971800" cy="458788"/>
+          </a:xfrm>
+          <a:prstGeom prst="rect">
+            <a:avLst/>
+          </a:prstGeom>
+        </p:spPr>
+        <p:txBody>
+          <a:bodyPr vert="horz" lIns="91440" tIns="45720" rIns="91440" bIns="45720" rtlCol="0"/>
+          <a:lstStyle>
+            <a:lvl1pPr algn="l">
+              <a:defRPr sz="1200"/>
+            </a:lvl1pPr>
+          </a:lstStyle>
+          <a:p>
+            <a:endParaRPr lang="en-GB"/>
+          </a:p>
+        </p:txBody>
+      </p:sp>
+      <p:sp>
+        <p:nvSpPr>
+          <p:cNvPr id="3" name="Date Placeholder 2"/>
+          <p:cNvSpPr>
+            <a:spLocks noGrp="1"/>
+          </p:cNvSpPr>
+          <p:nvPr>
+            <p:ph type="dt" idx="1"/>
+          </p:nvPr>
+        </p:nvSpPr>
+        <p:spPr>
+          <a:xfrm>
+            <a:off x="3884613" y="0"/>
+            <a:ext cx="2971800" cy="458788"/>
+          </a:xfrm>
+          <a:prstGeom prst="rect">
+            <a:avLst/>
+          </a:prstGeom>
+        </p:spPr>
+        <p:txBody>
+          <a:bodyPr vert="horz" lIns="91440" tIns="45720" rIns="91440" bIns="45720" rtlCol="0"/>
+          <a:lstStyle>
+            <a:lvl1pPr algn="r">
+              <a:defRPr sz="1200"/>
+            </a:lvl1pPr>
+          </a:lstStyle>
+          <a:p>
+            <a:fld id="{A911E331-7F21-4308-9146-4F48F350B578}" type="datetimeFigureOut">
+              <a:rPr lang="en-GB" smtClean="0"/>
+              <a:t>08/08/2025</a:t>
+            </a:fld>
+            <a:endParaRPr lang="en-GB"/>
+          </a:p>
+        </p:txBody>
+      </p:sp>
+      <p:sp>
+        <p:nvSpPr>
+          <p:cNvPr id="4" name="Slide Image Placeholder 3"/>
+          <p:cNvSpPr>
+            <a:spLocks noGrp="1" noRot="1" noChangeAspect="1"/>
+          </p:cNvSpPr>
+          <p:nvPr>
+            <p:ph type="sldImg" idx="2"/>
+          </p:nvPr>
+        </p:nvSpPr>
+        <p:spPr>
+          <a:xfrm>
+            <a:off x="1371600" y="1143000"/>
+            <a:ext cx="4114800" cy="3086100"/>
+          </a:xfrm>
+          <a:prstGeom prst="rect">
+            <a:avLst/>
+          </a:prstGeom>
+          <a:noFill/>
+          <a:ln w="12700">
+            <a:solidFill>
+              <a:prstClr val="black"/>
+            </a:solidFill>
+          </a:ln>
+        </p:spPr>
+        <p:txBody>
+          <a:bodyPr vert="horz" lIns="91440" tIns="45720" rIns="91440" bIns="45720" rtlCol="0" anchor="ctr"/>
+          <a:lstStyle/>
+          <a:p>
+            <a:endParaRPr lang="en-GB"/>
+          </a:p>
+        </p:txBody>
+      </p:sp>
+      <p:sp>
+        <p:nvSpPr>
+          <p:cNvPr id="5" name="Notes Placeholder 4"/>
+          <p:cNvSpPr>
+            <a:spLocks noGrp="1"/>
+          </p:cNvSpPr>
+          <p:nvPr>
+            <p:ph type="body" sz="quarter" idx="3"/>
+          </p:nvPr>
+        </p:nvSpPr>
+        <p:spPr>
+          <a:xfrm>
+            <a:off x="685800" y="4400550"/>
+            <a:ext cx="5486400" cy="3600450"/>
+          </a:xfrm>
+          <a:prstGeom prst="rect">
+            <a:avLst/>
+          </a:prstGeom>
+        </p:spPr>
+        <p:txBody>
+          <a:bodyPr vert="horz" lIns="91440" tIns="45720" rIns="91440" bIns="45720" rtlCol="0"/>
+          <a:lstStyle/>
+          <a:p>
+            <a:pPr lvl="0"/>
+            <a:r>
+              <a:rPr lang="en-US"/>
+              <a:t>Click to edit Master text styles</a:t>
+            </a:r>
+          </a:p>
+          <a:p>
+            <a:pPr lvl="1"/>
+            <a:r>
+              <a:rPr lang="en-US"/>
+              <a:t>Second level</a:t>
+            </a:r>
+          </a:p>
+          <a:p>
+            <a:pPr lvl="2"/>
+            <a:r>
+              <a:rPr lang="en-US"/>
+              <a:t>Third level</a:t>
+            </a:r>
+          </a:p>
+          <a:p>
+            <a:pPr lvl="3"/>
+            <a:r>
+              <a:rPr lang="en-US"/>
+              <a:t>Fourth level</a:t>
+            </a:r>
+          </a:p>
+          <a:p>
+            <a:pPr lvl="4"/>
+            <a:r>
+              <a:rPr lang="en-US"/>
+              <a:t>Fifth level</a:t>
+            </a:r>
+            <a:endParaRPr lang="en-GB"/>
+          </a:p>
+        </p:txBody>
+      </p:sp>
+      <p:sp>
+        <p:nvSpPr>
+          <p:cNvPr id="6" name="Footer Placeholder 5"/>
+          <p:cNvSpPr>
+            <a:spLocks noGrp="1"/>
+          </p:cNvSpPr>
+          <p:nvPr>
+            <p:ph type="ftr" sz="quarter" idx="4"/>
+          </p:nvPr>
+        </p:nvSpPr>
+        <p:spPr>
+          <a:xfrm>
+            <a:off x="0" y="8685213"/>
+            <a:ext cx="2971800" cy="458787"/>
+          </a:xfrm>
+          <a:prstGeom prst="rect">
+            <a:avLst/>
+          </a:prstGeom>
+        </p:spPr>
+        <p:txBody>
+          <a:bodyPr vert="horz" lIns="91440" tIns="45720" rIns="91440" bIns="45720" rtlCol="0" anchor="b"/>
+          <a:lstStyle>
+            <a:lvl1pPr algn="l">
+              <a:defRPr sz="1200"/>
+            </a:lvl1pPr>
+          </a:lstStyle>
+          <a:p>
+            <a:endParaRPr lang="en-GB"/>
+          </a:p>
+        </p:txBody>
+      </p:sp>
+      <p:sp>
+        <p:nvSpPr>
+          <p:cNvPr id="7" name="Slide Number Placeholder 6"/>
+          <p:cNvSpPr>
+            <a:spLocks noGrp="1"/>
+          </p:cNvSpPr>
+          <p:nvPr>
+            <p:ph type="sldNum" sz="quarter" idx="5"/>
+          </p:nvPr>
+        </p:nvSpPr>
+        <p:spPr>
+          <a:xfrm>
+            <a:off x="3884613" y="8685213"/>
+            <a:ext cx="2971800" cy="458787"/>
+          </a:xfrm>
+          <a:prstGeom prst="rect">
+            <a:avLst/>
+          </a:prstGeom>
+        </p:spPr>
+        <p:txBody>
+          <a:bodyPr vert="horz" lIns="91440" tIns="45720" rIns="91440" bIns="45720" rtlCol="0" anchor="b"/>
+          <a:lstStyle>
+            <a:lvl1pPr algn="r">
+              <a:defRPr sz="1200"/>
+            </a:lvl1pPr>
+          </a:lstStyle>
+          <a:p>
+            <a:fld id="{94A95B98-1EC9-4F84-9088-1508E575EA4A}" type="slidenum">
+              <a:rPr lang="en-GB" smtClean="0"/>
+              <a:t>‹#›</a:t>
+            </a:fld>
+            <a:endParaRPr lang="en-GB"/>
+          </a:p>
+        </p:txBody>
+      </p:sp>
+    </p:spTree>
+    <p:extLst>
+      <p:ext uri="{BB962C8B-B14F-4D97-AF65-F5344CB8AC3E}">
+        <p14:creationId xmlns:p14="http://schemas.microsoft.com/office/powerpoint/2010/main" val="4107796044"/>
+      </p:ext>
+    </p:extLst>
+  </p:cSld>
+  <p:clrMap bg1="lt1" tx1="dk1" bg2="lt2" tx2="dk2" accent1="accent1" accent2="accent2" accent3="accent3" accent4="accent4" accent5="accent5" accent6="accent6" hlink="hlink" folHlink="folHlink"/>
+  <p:notesStyle>
+    <a:lvl1pPr marL="0" algn="l" defTabSz="914400" rtl="0" eaLnBrk="1" latinLnBrk="0" hangingPunct="1">
+      <a:defRPr sz="1200" kern="1200">
+        <a:solidFill>
+          <a:schemeClr val="tx1"/>
+        </a:solidFill>
+        <a:latin typeface="+mn-lt"/>
+        <a:ea typeface="+mn-ea"/>
+        <a:cs typeface="+mn-cs"/>
+      </a:defRPr>
+    </a:lvl1pPr>
+    <a:lvl2pPr marL="457200" algn="l" defTabSz="914400" rtl="0" eaLnBrk="1" latinLnBrk="0" hangingPunct="1">
+      <a:defRPr sz="1200" kern="1200">
+        <a:solidFill>
+          <a:schemeClr val="tx1"/>
+        </a:solidFill>
+        <a:latin typeface="+mn-lt"/>
+        <a:ea typeface="+mn-ea"/>
+        <a:cs typeface="+mn-cs"/>
+      </a:defRPr>
+    </a:lvl2pPr>
+    <a:lvl3pPr marL="914400" algn="l" defTabSz="914400" rtl="0" eaLnBrk="1" latinLnBrk="0" hangingPunct="1">
+      <a:defRPr sz="1200" kern="1200">
+        <a:solidFill>
+          <a:schemeClr val="tx1"/>
+        </a:solidFill>
+        <a:latin typeface="+mn-lt"/>
+        <a:ea typeface="+mn-ea"/>
+        <a:cs typeface="+mn-cs"/>
+      </a:defRPr>
+    </a:lvl3pPr>
+    <a:lvl4pPr marL="1371600" algn="l" defTabSz="914400" rtl="0" eaLnBrk="1" latinLnBrk="0" hangingPunct="1">
+      <a:defRPr sz="1200" kern="1200">
+        <a:solidFill>
+          <a:schemeClr val="tx1"/>
+        </a:solidFill>
+        <a:latin typeface="+mn-lt"/>
+        <a:ea typeface="+mn-ea"/>
+        <a:cs typeface="+mn-cs"/>
+      </a:defRPr>
+    </a:lvl4pPr>
+    <a:lvl5pPr marL="1828800" algn="l" defTabSz="914400" rtl="0" eaLnBrk="1" latinLnBrk="0" hangingPunct="1">
+      <a:defRPr sz="1200" kern="1200">
+        <a:solidFill>
+          <a:schemeClr val="tx1"/>
+        </a:solidFill>
+        <a:latin typeface="+mn-lt"/>
+        <a:ea typeface="+mn-ea"/>
+        <a:cs typeface="+mn-cs"/>
+      </a:defRPr>
+    </a:lvl5pPr>
+    <a:lvl6pPr marL="2286000" algn="l" defTabSz="914400" rtl="0" eaLnBrk="1" latinLnBrk="0" hangingPunct="1">
+      <a:defRPr sz="1200" kern="1200">
+        <a:solidFill>
+          <a:schemeClr val="tx1"/>
+        </a:solidFill>
+        <a:latin typeface="+mn-lt"/>
+        <a:ea typeface="+mn-ea"/>
+        <a:cs typeface="+mn-cs"/>
+      </a:defRPr>
+    </a:lvl6pPr>
+    <a:lvl7pPr marL="2743200" algn="l" defTabSz="914400" rtl="0" eaLnBrk="1" latinLnBrk="0" hangingPunct="1">
+      <a:defRPr sz="1200" kern="1200">
+        <a:solidFill>
+          <a:schemeClr val="tx1"/>
+        </a:solidFill>
+        <a:latin typeface="+mn-lt"/>
+        <a:ea typeface="+mn-ea"/>
+        <a:cs typeface="+mn-cs"/>
+      </a:defRPr>
+    </a:lvl7pPr>
+    <a:lvl8pPr marL="3200400" algn="l" defTabSz="914400" rtl="0" eaLnBrk="1" latinLnBrk="0" hangingPunct="1">
+      <a:defRPr sz="1200" kern="1200">
+        <a:solidFill>
+          <a:schemeClr val="tx1"/>
+        </a:solidFill>
+        <a:latin typeface="+mn-lt"/>
+        <a:ea typeface="+mn-ea"/>
+        <a:cs typeface="+mn-cs"/>
+      </a:defRPr>
+    </a:lvl8pPr>
+    <a:lvl9pPr marL="3657600" algn="l" defTabSz="914400" rtl="0" eaLnBrk="1" latinLnBrk="0" hangingPunct="1">
+      <a:defRPr sz="1200" kern="1200">
+        <a:solidFill>
+          <a:schemeClr val="tx1"/>
+        </a:solidFill>
+        <a:latin typeface="+mn-lt"/>
+        <a:ea typeface="+mn-ea"/>
+        <a:cs typeface="+mn-cs"/>
+      </a:defRPr>
+    </a:lvl9pPr>
+  </p:notesStyle>
+</p:notesMaster>
+</file>
+
+<file path=ppt/notesSlides/notesSlide1.xml><?xml version="1.0" encoding="utf-8"?>
+<p:notes xmlns:a="http://schemas.openxmlformats.org/drawingml/2006/main" xmlns:r="http://schemas.openxmlformats.org/officeDocument/2006/relationships" xmlns:p="http://schemas.openxmlformats.org/presentationml/2006/main">
+  <p:cSld>
+    <p:spTree>
+      <p:nvGrpSpPr>
+        <p:cNvPr id="1" name=""/>
+        <p:cNvGrpSpPr/>
+        <p:nvPr/>
+      </p:nvGrpSpPr>
+      <p:grpSpPr>
+        <a:xfrm>
+          <a:off x="0" y="0"/>
+          <a:ext cx="0" cy="0"/>
+          <a:chOff x="0" y="0"/>
+          <a:chExt cx="0" cy="0"/>
+        </a:xfrm>
+      </p:grpSpPr>
+      <p:sp>
+        <p:nvSpPr>
+          <p:cNvPr id="2" name="Slide Image Placeholder 1"/>
+          <p:cNvSpPr>
+            <a:spLocks noGrp="1" noRot="1" noChangeAspect="1"/>
+          </p:cNvSpPr>
+          <p:nvPr>
+            <p:ph type="sldImg"/>
+          </p:nvPr>
+        </p:nvSpPr>
+        <p:spPr/>
+      </p:sp>
+      <p:sp>
+        <p:nvSpPr>
+          <p:cNvPr id="3" name="Notes Placeholder 2"/>
+          <p:cNvSpPr>
+            <a:spLocks noGrp="1"/>
+          </p:cNvSpPr>
+          <p:nvPr>
+            <p:ph type="body" idx="1"/>
+          </p:nvPr>
+        </p:nvSpPr>
+        <p:spPr/>
+        <p:txBody>
+          <a:bodyPr/>
+          <a:lstStyle/>
+          <a:p>
+            <a:endParaRPr lang="en-GB" dirty="0"/>
+          </a:p>
+        </p:txBody>
+      </p:sp>
+      <p:sp>
+        <p:nvSpPr>
+          <p:cNvPr id="4" name="Slide Number Placeholder 3"/>
+          <p:cNvSpPr>
+            <a:spLocks noGrp="1"/>
+          </p:cNvSpPr>
+          <p:nvPr>
+            <p:ph type="sldNum" sz="quarter" idx="5"/>
+          </p:nvPr>
+        </p:nvSpPr>
+        <p:spPr/>
+        <p:txBody>
+          <a:bodyPr/>
+          <a:lstStyle/>
+          <a:p>
+            <a:fld id="{94A95B98-1EC9-4F84-9088-1508E575EA4A}" type="slidenum">
+              <a:rPr lang="en-GB" smtClean="0"/>
+              <a:t>2</a:t>
+            </a:fld>
+            <a:endParaRPr lang="en-GB"/>
+          </a:p>
+        </p:txBody>
+      </p:sp>
+    </p:spTree>
+    <p:extLst>
+      <p:ext uri="{BB962C8B-B14F-4D97-AF65-F5344CB8AC3E}">
+        <p14:creationId xmlns:p14="http://schemas.microsoft.com/office/powerpoint/2010/main" val="2143799448"/>
+      </p:ext>
+    </p:extLst>
+  </p:cSld>
+  <p:clrMapOvr>
+    <a:masterClrMapping/>
+  </p:clrMapOvr>
+</p:notes>
 </file>
 
 <file path=ppt/slideLayouts/slideLayout1.xml><?xml version="1.0" encoding="utf-8"?>
@@ -3364,7 +3806,7 @@
           <p:nvPr/>
         </p:nvPicPr>
         <p:blipFill>
-          <a:blip r:embed="rId2">
+          <a:blip r:embed="rId3">
             <a:alphaModFix amt="50000"/>
             <a:extLst>
               <a:ext uri="{28A0092B-C50C-407E-A947-70E740481C1C}">
@@ -3379,7 +3821,7 @@
         </p:blipFill>
         <p:spPr>
           <a:xfrm>
-            <a:off x="28861" y="21937"/>
+            <a:off x="28861" y="0"/>
             <a:ext cx="9086277" cy="6836063"/>
           </a:xfrm>
           <a:prstGeom prst="rect">
@@ -3417,7 +3859,7 @@
               <a:rPr lang="en-GB" dirty="0">
                 <a:latin typeface="Comic Sans MS" panose="030F0702030302020204" pitchFamily="66" charset="0"/>
               </a:rPr>
-              <a:t>Project Contributions</a:t>
+              <a:t>Project Idea</a:t>
             </a:r>
           </a:p>
         </p:txBody>
@@ -3440,83 +3882,131 @@
         </p:nvSpPr>
         <p:spPr>
           <a:xfrm>
-            <a:off x="628650" y="1825624"/>
-            <a:ext cx="7886700" cy="4894489"/>
+            <a:off x="628649" y="5684790"/>
+            <a:ext cx="7886700" cy="884284"/>
           </a:xfrm>
         </p:spPr>
         <p:txBody>
           <a:bodyPr>
-            <a:normAutofit fontScale="85000" lnSpcReduction="20000"/>
+            <a:normAutofit/>
           </a:bodyPr>
           <a:lstStyle/>
           <a:p>
+            <a:pPr marL="0" indent="0">
+              <a:buNone/>
+            </a:pPr>
             <a:r>
               <a:rPr lang="en-GB" dirty="0">
                 <a:latin typeface="Comic Sans MS" panose="030F0702030302020204" pitchFamily="66" charset="0"/>
               </a:rPr>
-              <a:t>Implemented a HDMI output in ASIC.</a:t>
-            </a:r>
-          </a:p>
-          <a:p>
-            <a:endParaRPr lang="en-GB" dirty="0">
-              <a:latin typeface="Comic Sans MS" panose="030F0702030302020204" pitchFamily="66" charset="0"/>
-            </a:endParaRPr>
-          </a:p>
-          <a:p>
-            <a:endParaRPr lang="en-GB" dirty="0">
-              <a:latin typeface="Comic Sans MS" panose="030F0702030302020204" pitchFamily="66" charset="0"/>
-            </a:endParaRPr>
-          </a:p>
-          <a:p>
-            <a:endParaRPr lang="en-GB" dirty="0">
-              <a:latin typeface="Comic Sans MS" panose="030F0702030302020204" pitchFamily="66" charset="0"/>
-            </a:endParaRPr>
-          </a:p>
-          <a:p>
-            <a:endParaRPr lang="en-GB" dirty="0">
-              <a:latin typeface="Comic Sans MS" panose="030F0702030302020204" pitchFamily="66" charset="0"/>
-            </a:endParaRPr>
-          </a:p>
-          <a:p>
-            <a:endParaRPr lang="en-GB" dirty="0">
-              <a:latin typeface="Comic Sans MS" panose="030F0702030302020204" pitchFamily="66" charset="0"/>
-            </a:endParaRPr>
-          </a:p>
-          <a:p>
-            <a:endParaRPr lang="en-GB" dirty="0">
-              <a:latin typeface="Comic Sans MS" panose="030F0702030302020204" pitchFamily="66" charset="0"/>
-            </a:endParaRPr>
-          </a:p>
-          <a:p>
-            <a:r>
-              <a:rPr lang="en-GB" dirty="0">
-                <a:latin typeface="Comic Sans MS" panose="030F0702030302020204" pitchFamily="66" charset="0"/>
-              </a:rPr>
-              <a:t>Added Tang Nano 9K FPGA support to the template (yes, there is a pull-request).</a:t>
-            </a:r>
-          </a:p>
-          <a:p>
-            <a:r>
-              <a:rPr lang="en-GB" dirty="0">
-                <a:latin typeface="Comic Sans MS" panose="030F0702030302020204" pitchFamily="66" charset="0"/>
-              </a:rPr>
-              <a:t>Showed that mixed language (SystemVerilog + VHDL) works in the flow.</a:t>
-            </a:r>
-          </a:p>
-          <a:p>
-            <a:r>
-              <a:rPr lang="en-GB" dirty="0">
-                <a:latin typeface="Comic Sans MS" panose="030F0702030302020204" pitchFamily="66" charset="0"/>
-              </a:rPr>
-              <a:t>Implemented demonstration shaders.</a:t>
-            </a:r>
-          </a:p>
-          <a:p>
-            <a:r>
-              <a:rPr lang="en-GB" dirty="0">
-                <a:latin typeface="Comic Sans MS" panose="030F0702030302020204" pitchFamily="66" charset="0"/>
-              </a:rPr>
-              <a:t>Implemented memory interface &amp; upscaling.</a:t>
+              <a:t>The Game of Life in an ASIC with a HDMI output would be cool</a:t>
+            </a:r>
+          </a:p>
+        </p:txBody>
+      </p:sp>
+      <p:pic>
+        <p:nvPicPr>
+          <p:cNvPr id="5" name="Picture 4" descr="A screenshot of a video game&#10;&#10;AI-generated content may be incorrect.">
+            <a:extLst>
+              <a:ext uri="{FF2B5EF4-FFF2-40B4-BE49-F238E27FC236}">
+                <a16:creationId xmlns:a16="http://schemas.microsoft.com/office/drawing/2014/main" id="{2C501AEE-E8DD-3A4F-EDE3-EA726F595391}"/>
+              </a:ext>
+            </a:extLst>
+          </p:cNvPr>
+          <p:cNvPicPr>
+            <a:picLocks noChangeAspect="1"/>
+          </p:cNvPicPr>
+          <p:nvPr/>
+        </p:nvPicPr>
+        <p:blipFill>
+          <a:blip r:embed="rId4">
+            <a:extLst>
+              <a:ext uri="{28A0092B-C50C-407E-A947-70E740481C1C}">
+                <a14:useLocalDpi xmlns:a14="http://schemas.microsoft.com/office/drawing/2010/main" val="0"/>
+              </a:ext>
+            </a:extLst>
+          </a:blip>
+          <a:stretch>
+            <a:fillRect/>
+          </a:stretch>
+        </p:blipFill>
+        <p:spPr>
+          <a:xfrm>
+            <a:off x="377189" y="1480074"/>
+            <a:ext cx="4128516" cy="4128516"/>
+          </a:xfrm>
+          <a:prstGeom prst="rect">
+            <a:avLst/>
+          </a:prstGeom>
+        </p:spPr>
+      </p:pic>
+      <p:pic>
+        <p:nvPicPr>
+          <p:cNvPr id="8" name="Picture 7" descr="A screenshot of a video game&#10;&#10;AI-generated content may be incorrect.">
+            <a:extLst>
+              <a:ext uri="{FF2B5EF4-FFF2-40B4-BE49-F238E27FC236}">
+                <a16:creationId xmlns:a16="http://schemas.microsoft.com/office/drawing/2014/main" id="{51943CA8-ECE6-4516-8B9B-D81035EEB976}"/>
+              </a:ext>
+            </a:extLst>
+          </p:cNvPr>
+          <p:cNvPicPr>
+            <a:picLocks noChangeAspect="1"/>
+          </p:cNvPicPr>
+          <p:nvPr/>
+        </p:nvPicPr>
+        <p:blipFill>
+          <a:blip r:embed="rId5">
+            <a:extLst>
+              <a:ext uri="{28A0092B-C50C-407E-A947-70E740481C1C}">
+                <a14:useLocalDpi xmlns:a14="http://schemas.microsoft.com/office/drawing/2010/main" val="0"/>
+              </a:ext>
+            </a:extLst>
+          </a:blip>
+          <a:stretch>
+            <a:fillRect/>
+          </a:stretch>
+        </p:blipFill>
+        <p:spPr>
+          <a:xfrm>
+            <a:off x="4658440" y="1480074"/>
+            <a:ext cx="4128516" cy="4128516"/>
+          </a:xfrm>
+          <a:prstGeom prst="rect">
+            <a:avLst/>
+          </a:prstGeom>
+        </p:spPr>
+      </p:pic>
+      <p:sp>
+        <p:nvSpPr>
+          <p:cNvPr id="10" name="TextBox 9">
+            <a:extLst>
+              <a:ext uri="{FF2B5EF4-FFF2-40B4-BE49-F238E27FC236}">
+                <a16:creationId xmlns:a16="http://schemas.microsoft.com/office/drawing/2014/main" id="{562610A7-02F3-B084-4736-4274040A613B}"/>
+              </a:ext>
+            </a:extLst>
+          </p:cNvPr>
+          <p:cNvSpPr txBox="1"/>
+          <p:nvPr/>
+        </p:nvSpPr>
+        <p:spPr>
+          <a:xfrm>
+            <a:off x="653414" y="6535609"/>
+            <a:ext cx="8490586" cy="338554"/>
+          </a:xfrm>
+          <a:prstGeom prst="rect">
+            <a:avLst/>
+          </a:prstGeom>
+          <a:noFill/>
+        </p:spPr>
+        <p:txBody>
+          <a:bodyPr wrap="square" rtlCol="0">
+            <a:spAutoFit/>
+          </a:bodyPr>
+          <a:lstStyle/>
+          <a:p>
+            <a:r>
+              <a:rPr lang="en-GB" sz="1600" dirty="0"/>
+              <a:t>Videos reproduced from https://experiments.withgoogle.com/conway-game-of-life </a:t>
             </a:r>
           </a:p>
         </p:txBody>
@@ -3534,6 +4024,138 @@
   <p:transition>
     <p:fade/>
   </p:transition>
+  <p:timing>
+    <p:tnLst>
+      <p:par>
+        <p:cTn id="1" dur="indefinite" restart="never" nodeType="tmRoot">
+          <p:childTnLst>
+            <p:seq concurrent="1" nextAc="seek">
+              <p:cTn id="2" dur="indefinite" nodeType="mainSeq">
+                <p:childTnLst>
+                  <p:par>
+                    <p:cTn id="3" fill="hold">
+                      <p:stCondLst>
+                        <p:cond delay="indefinite"/>
+                      </p:stCondLst>
+                      <p:childTnLst>
+                        <p:par>
+                          <p:cTn id="4" fill="hold">
+                            <p:stCondLst>
+                              <p:cond delay="0"/>
+                            </p:stCondLst>
+                            <p:childTnLst>
+                              <p:par>
+                                <p:cTn id="5" presetID="1" presetClass="entr" presetSubtype="0" fill="hold" nodeType="clickEffect">
+                                  <p:stCondLst>
+                                    <p:cond delay="0"/>
+                                  </p:stCondLst>
+                                  <p:childTnLst>
+                                    <p:set>
+                                      <p:cBhvr>
+                                        <p:cTn id="6" dur="1" fill="hold">
+                                          <p:stCondLst>
+                                            <p:cond delay="0"/>
+                                          </p:stCondLst>
+                                        </p:cTn>
+                                        <p:tgtEl>
+                                          <p:spTgt spid="8"/>
+                                        </p:tgtEl>
+                                        <p:attrNameLst>
+                                          <p:attrName>style.visibility</p:attrName>
+                                        </p:attrNameLst>
+                                      </p:cBhvr>
+                                      <p:to>
+                                        <p:strVal val="visible"/>
+                                      </p:to>
+                                    </p:set>
+                                  </p:childTnLst>
+                                </p:cTn>
+                              </p:par>
+                              <p:par>
+                                <p:cTn id="7" presetID="1" presetClass="entr" presetSubtype="0" fill="hold" nodeType="withEffect">
+                                  <p:stCondLst>
+                                    <p:cond delay="0"/>
+                                  </p:stCondLst>
+                                  <p:childTnLst>
+                                    <p:set>
+                                      <p:cBhvr>
+                                        <p:cTn id="8" dur="1" fill="hold">
+                                          <p:stCondLst>
+                                            <p:cond delay="0"/>
+                                          </p:stCondLst>
+                                        </p:cTn>
+                                        <p:tgtEl>
+                                          <p:spTgt spid="5"/>
+                                        </p:tgtEl>
+                                        <p:attrNameLst>
+                                          <p:attrName>style.visibility</p:attrName>
+                                        </p:attrNameLst>
+                                      </p:cBhvr>
+                                      <p:to>
+                                        <p:strVal val="visible"/>
+                                      </p:to>
+                                    </p:set>
+                                  </p:childTnLst>
+                                </p:cTn>
+                              </p:par>
+                              <p:par>
+                                <p:cTn id="9" presetID="1" presetClass="entr" presetSubtype="0" fill="hold" grpId="0" nodeType="withEffect">
+                                  <p:stCondLst>
+                                    <p:cond delay="0"/>
+                                  </p:stCondLst>
+                                  <p:childTnLst>
+                                    <p:set>
+                                      <p:cBhvr>
+                                        <p:cTn id="10" dur="1" fill="hold">
+                                          <p:stCondLst>
+                                            <p:cond delay="0"/>
+                                          </p:stCondLst>
+                                        </p:cTn>
+                                        <p:tgtEl>
+                                          <p:spTgt spid="10"/>
+                                        </p:tgtEl>
+                                        <p:attrNameLst>
+                                          <p:attrName>style.visibility</p:attrName>
+                                        </p:attrNameLst>
+                                      </p:cBhvr>
+                                      <p:to>
+                                        <p:strVal val="visible"/>
+                                      </p:to>
+                                    </p:set>
+                                  </p:childTnLst>
+                                </p:cTn>
+                              </p:par>
+                            </p:childTnLst>
+                          </p:cTn>
+                        </p:par>
+                      </p:childTnLst>
+                    </p:cTn>
+                  </p:par>
+                </p:childTnLst>
+              </p:cTn>
+              <p:prevCondLst>
+                <p:cond evt="onPrev" delay="0">
+                  <p:tgtEl>
+                    <p:sldTgt/>
+                  </p:tgtEl>
+                </p:cond>
+              </p:prevCondLst>
+              <p:nextCondLst>
+                <p:cond evt="onNext" delay="0">
+                  <p:tgtEl>
+                    <p:sldTgt/>
+                  </p:tgtEl>
+                </p:cond>
+              </p:nextCondLst>
+            </p:seq>
+          </p:childTnLst>
+        </p:cTn>
+      </p:par>
+    </p:tnLst>
+    <p:bldLst>
+      <p:bldP spid="10" grpId="0"/>
+    </p:bldLst>
+  </p:timing>
 </p:sld>
 </file>
 
@@ -3594,10 +4216,10 @@
       </p:pic>
       <p:sp>
         <p:nvSpPr>
-          <p:cNvPr id="2" name="Title 1">
+          <p:cNvPr id="4" name="Title 1">
             <a:extLst>
               <a:ext uri="{FF2B5EF4-FFF2-40B4-BE49-F238E27FC236}">
-                <a16:creationId xmlns:a16="http://schemas.microsoft.com/office/drawing/2014/main" id="{53C11A35-035E-EDEB-3C02-B3E892250AC2}"/>
+                <a16:creationId xmlns:a16="http://schemas.microsoft.com/office/drawing/2014/main" id="{F11D063B-B394-EB54-2829-89CD1A05998C}"/>
               </a:ext>
             </a:extLst>
           </p:cNvPr>
@@ -3608,37 +4230,285 @@
             <p:ph type="title"/>
           </p:nvPr>
         </p:nvSpPr>
-        <p:spPr/>
-        <p:txBody>
-          <a:bodyPr/>
-          <a:lstStyle/>
-          <a:p>
-            <a:endParaRPr lang="en-GB"/>
-          </a:p>
-        </p:txBody>
-      </p:sp>
-      <p:sp>
-        <p:nvSpPr>
-          <p:cNvPr id="3" name="Content Placeholder 2">
+        <p:spPr>
+          <a:xfrm>
+            <a:off x="628650" y="365126"/>
+            <a:ext cx="7886700" cy="1325563"/>
+          </a:xfrm>
+        </p:spPr>
+        <p:txBody>
+          <a:bodyPr/>
+          <a:lstStyle/>
+          <a:p>
+            <a:r>
+              <a:rPr lang="en-GB" dirty="0">
+                <a:latin typeface="Comic Sans MS" panose="030F0702030302020204" pitchFamily="66" charset="0"/>
+              </a:rPr>
+              <a:t>Project Contributions</a:t>
+            </a:r>
+          </a:p>
+        </p:txBody>
+      </p:sp>
+      <p:sp>
+        <p:nvSpPr>
+          <p:cNvPr id="5" name="Content Placeholder 2">
             <a:extLst>
               <a:ext uri="{FF2B5EF4-FFF2-40B4-BE49-F238E27FC236}">
-                <a16:creationId xmlns:a16="http://schemas.microsoft.com/office/drawing/2014/main" id="{18A7B448-9CB3-8FFC-CFE1-F06E3D895923}"/>
+                <a16:creationId xmlns:a16="http://schemas.microsoft.com/office/drawing/2014/main" id="{2674BB64-B257-9BEE-26A0-59BA9EC85CF8}"/>
               </a:ext>
             </a:extLst>
           </p:cNvPr>
-          <p:cNvSpPr>
-            <a:spLocks noGrp="1"/>
-          </p:cNvSpPr>
-          <p:nvPr>
-            <p:ph idx="1"/>
-          </p:nvPr>
-        </p:nvSpPr>
-        <p:spPr/>
-        <p:txBody>
-          <a:bodyPr/>
-          <a:lstStyle/>
-          <a:p>
-            <a:endParaRPr lang="en-GB"/>
+          <p:cNvSpPr txBox="1">
+            <a:spLocks/>
+          </p:cNvSpPr>
+          <p:nvPr/>
+        </p:nvSpPr>
+        <p:spPr>
+          <a:xfrm>
+            <a:off x="628650" y="1825624"/>
+            <a:ext cx="7886700" cy="4894489"/>
+          </a:xfrm>
+          <a:prstGeom prst="rect">
+            <a:avLst/>
+          </a:prstGeom>
+        </p:spPr>
+        <p:txBody>
+          <a:bodyPr vert="horz" lIns="91440" tIns="45720" rIns="91440" bIns="45720" rtlCol="0">
+            <a:normAutofit fontScale="85000" lnSpcReduction="20000"/>
+          </a:bodyPr>
+          <a:lstStyle>
+            <a:lvl1pPr marL="228600" indent="-228600" algn="l" defTabSz="914400" rtl="0" eaLnBrk="1" latinLnBrk="0" hangingPunct="1">
+              <a:lnSpc>
+                <a:spcPct val="90000"/>
+              </a:lnSpc>
+              <a:spcBef>
+                <a:spcPts val="1000"/>
+              </a:spcBef>
+              <a:buFont typeface="Arial" panose="020B0604020202020204" pitchFamily="34" charset="0"/>
+              <a:buChar char="•"/>
+              <a:defRPr sz="2800" kern="1200">
+                <a:solidFill>
+                  <a:schemeClr val="tx1"/>
+                </a:solidFill>
+                <a:latin typeface="+mn-lt"/>
+                <a:ea typeface="+mn-ea"/>
+                <a:cs typeface="+mn-cs"/>
+              </a:defRPr>
+            </a:lvl1pPr>
+            <a:lvl2pPr marL="685800" indent="-228600" algn="l" defTabSz="914400" rtl="0" eaLnBrk="1" latinLnBrk="0" hangingPunct="1">
+              <a:lnSpc>
+                <a:spcPct val="90000"/>
+              </a:lnSpc>
+              <a:spcBef>
+                <a:spcPts val="500"/>
+              </a:spcBef>
+              <a:buFont typeface="Arial" panose="020B0604020202020204" pitchFamily="34" charset="0"/>
+              <a:buChar char="•"/>
+              <a:defRPr sz="2400" kern="1200">
+                <a:solidFill>
+                  <a:schemeClr val="tx1"/>
+                </a:solidFill>
+                <a:latin typeface="+mn-lt"/>
+                <a:ea typeface="+mn-ea"/>
+                <a:cs typeface="+mn-cs"/>
+              </a:defRPr>
+            </a:lvl2pPr>
+            <a:lvl3pPr marL="1143000" indent="-228600" algn="l" defTabSz="914400" rtl="0" eaLnBrk="1" latinLnBrk="0" hangingPunct="1">
+              <a:lnSpc>
+                <a:spcPct val="90000"/>
+              </a:lnSpc>
+              <a:spcBef>
+                <a:spcPts val="500"/>
+              </a:spcBef>
+              <a:buFont typeface="Arial" panose="020B0604020202020204" pitchFamily="34" charset="0"/>
+              <a:buChar char="•"/>
+              <a:defRPr sz="2000" kern="1200">
+                <a:solidFill>
+                  <a:schemeClr val="tx1"/>
+                </a:solidFill>
+                <a:latin typeface="+mn-lt"/>
+                <a:ea typeface="+mn-ea"/>
+                <a:cs typeface="+mn-cs"/>
+              </a:defRPr>
+            </a:lvl3pPr>
+            <a:lvl4pPr marL="1600200" indent="-228600" algn="l" defTabSz="914400" rtl="0" eaLnBrk="1" latinLnBrk="0" hangingPunct="1">
+              <a:lnSpc>
+                <a:spcPct val="90000"/>
+              </a:lnSpc>
+              <a:spcBef>
+                <a:spcPts val="500"/>
+              </a:spcBef>
+              <a:buFont typeface="Arial" panose="020B0604020202020204" pitchFamily="34" charset="0"/>
+              <a:buChar char="•"/>
+              <a:defRPr sz="1800" kern="1200">
+                <a:solidFill>
+                  <a:schemeClr val="tx1"/>
+                </a:solidFill>
+                <a:latin typeface="+mn-lt"/>
+                <a:ea typeface="+mn-ea"/>
+                <a:cs typeface="+mn-cs"/>
+              </a:defRPr>
+            </a:lvl4pPr>
+            <a:lvl5pPr marL="2057400" indent="-228600" algn="l" defTabSz="914400" rtl="0" eaLnBrk="1" latinLnBrk="0" hangingPunct="1">
+              <a:lnSpc>
+                <a:spcPct val="90000"/>
+              </a:lnSpc>
+              <a:spcBef>
+                <a:spcPts val="500"/>
+              </a:spcBef>
+              <a:buFont typeface="Arial" panose="020B0604020202020204" pitchFamily="34" charset="0"/>
+              <a:buChar char="•"/>
+              <a:defRPr sz="1800" kern="1200">
+                <a:solidFill>
+                  <a:schemeClr val="tx1"/>
+                </a:solidFill>
+                <a:latin typeface="+mn-lt"/>
+                <a:ea typeface="+mn-ea"/>
+                <a:cs typeface="+mn-cs"/>
+              </a:defRPr>
+            </a:lvl5pPr>
+            <a:lvl6pPr marL="2514600" indent="-228600" algn="l" defTabSz="914400" rtl="0" eaLnBrk="1" latinLnBrk="0" hangingPunct="1">
+              <a:lnSpc>
+                <a:spcPct val="90000"/>
+              </a:lnSpc>
+              <a:spcBef>
+                <a:spcPts val="500"/>
+              </a:spcBef>
+              <a:buFont typeface="Arial" panose="020B0604020202020204" pitchFamily="34" charset="0"/>
+              <a:buChar char="•"/>
+              <a:defRPr sz="1800" kern="1200">
+                <a:solidFill>
+                  <a:schemeClr val="tx1"/>
+                </a:solidFill>
+                <a:latin typeface="+mn-lt"/>
+                <a:ea typeface="+mn-ea"/>
+                <a:cs typeface="+mn-cs"/>
+              </a:defRPr>
+            </a:lvl6pPr>
+            <a:lvl7pPr marL="2971800" indent="-228600" algn="l" defTabSz="914400" rtl="0" eaLnBrk="1" latinLnBrk="0" hangingPunct="1">
+              <a:lnSpc>
+                <a:spcPct val="90000"/>
+              </a:lnSpc>
+              <a:spcBef>
+                <a:spcPts val="500"/>
+              </a:spcBef>
+              <a:buFont typeface="Arial" panose="020B0604020202020204" pitchFamily="34" charset="0"/>
+              <a:buChar char="•"/>
+              <a:defRPr sz="1800" kern="1200">
+                <a:solidFill>
+                  <a:schemeClr val="tx1"/>
+                </a:solidFill>
+                <a:latin typeface="+mn-lt"/>
+                <a:ea typeface="+mn-ea"/>
+                <a:cs typeface="+mn-cs"/>
+              </a:defRPr>
+            </a:lvl7pPr>
+            <a:lvl8pPr marL="3429000" indent="-228600" algn="l" defTabSz="914400" rtl="0" eaLnBrk="1" latinLnBrk="0" hangingPunct="1">
+              <a:lnSpc>
+                <a:spcPct val="90000"/>
+              </a:lnSpc>
+              <a:spcBef>
+                <a:spcPts val="500"/>
+              </a:spcBef>
+              <a:buFont typeface="Arial" panose="020B0604020202020204" pitchFamily="34" charset="0"/>
+              <a:buChar char="•"/>
+              <a:defRPr sz="1800" kern="1200">
+                <a:solidFill>
+                  <a:schemeClr val="tx1"/>
+                </a:solidFill>
+                <a:latin typeface="+mn-lt"/>
+                <a:ea typeface="+mn-ea"/>
+                <a:cs typeface="+mn-cs"/>
+              </a:defRPr>
+            </a:lvl8pPr>
+            <a:lvl9pPr marL="3886200" indent="-228600" algn="l" defTabSz="914400" rtl="0" eaLnBrk="1" latinLnBrk="0" hangingPunct="1">
+              <a:lnSpc>
+                <a:spcPct val="90000"/>
+              </a:lnSpc>
+              <a:spcBef>
+                <a:spcPts val="500"/>
+              </a:spcBef>
+              <a:buFont typeface="Arial" panose="020B0604020202020204" pitchFamily="34" charset="0"/>
+              <a:buChar char="•"/>
+              <a:defRPr sz="1800" kern="1200">
+                <a:solidFill>
+                  <a:schemeClr val="tx1"/>
+                </a:solidFill>
+                <a:latin typeface="+mn-lt"/>
+                <a:ea typeface="+mn-ea"/>
+                <a:cs typeface="+mn-cs"/>
+              </a:defRPr>
+            </a:lvl9pPr>
+          </a:lstStyle>
+          <a:p>
+            <a:r>
+              <a:rPr lang="en-GB" dirty="0">
+                <a:latin typeface="Comic Sans MS" panose="030F0702030302020204" pitchFamily="66" charset="0"/>
+              </a:rPr>
+              <a:t>Implemented a HDMI output in ASIC.</a:t>
+            </a:r>
+          </a:p>
+          <a:p>
+            <a:endParaRPr lang="en-GB" dirty="0">
+              <a:latin typeface="Comic Sans MS" panose="030F0702030302020204" pitchFamily="66" charset="0"/>
+            </a:endParaRPr>
+          </a:p>
+          <a:p>
+            <a:endParaRPr lang="en-GB" dirty="0">
+              <a:latin typeface="Comic Sans MS" panose="030F0702030302020204" pitchFamily="66" charset="0"/>
+            </a:endParaRPr>
+          </a:p>
+          <a:p>
+            <a:endParaRPr lang="en-GB" dirty="0">
+              <a:latin typeface="Comic Sans MS" panose="030F0702030302020204" pitchFamily="66" charset="0"/>
+            </a:endParaRPr>
+          </a:p>
+          <a:p>
+            <a:endParaRPr lang="en-GB" dirty="0">
+              <a:latin typeface="Comic Sans MS" panose="030F0702030302020204" pitchFamily="66" charset="0"/>
+            </a:endParaRPr>
+          </a:p>
+          <a:p>
+            <a:endParaRPr lang="en-GB" dirty="0">
+              <a:latin typeface="Comic Sans MS" panose="030F0702030302020204" pitchFamily="66" charset="0"/>
+            </a:endParaRPr>
+          </a:p>
+          <a:p>
+            <a:endParaRPr lang="en-GB" dirty="0">
+              <a:latin typeface="Comic Sans MS" panose="030F0702030302020204" pitchFamily="66" charset="0"/>
+            </a:endParaRPr>
+          </a:p>
+          <a:p>
+            <a:r>
+              <a:rPr lang="en-GB" dirty="0">
+                <a:latin typeface="Comic Sans MS" panose="030F0702030302020204" pitchFamily="66" charset="0"/>
+              </a:rPr>
+              <a:t>Added Tang Nano 9K FPGA support to the template (yes, there is a pull-request).</a:t>
+            </a:r>
+          </a:p>
+          <a:p>
+            <a:r>
+              <a:rPr lang="en-GB" dirty="0">
+                <a:latin typeface="Comic Sans MS" panose="030F0702030302020204" pitchFamily="66" charset="0"/>
+              </a:rPr>
+              <a:t>Showed that mixed language (SystemVerilog + VHDL) works in the flow.</a:t>
+            </a:r>
+          </a:p>
+          <a:p>
+            <a:r>
+              <a:rPr lang="en-GB" dirty="0">
+                <a:latin typeface="Comic Sans MS" panose="030F0702030302020204" pitchFamily="66" charset="0"/>
+              </a:rPr>
+              <a:t>Implemented demonstration shaders.</a:t>
+            </a:r>
+          </a:p>
+          <a:p>
+            <a:r>
+              <a:rPr lang="en-GB" dirty="0">
+                <a:latin typeface="Comic Sans MS" panose="030F0702030302020204" pitchFamily="66" charset="0"/>
+              </a:rPr>
+              <a:t>Implemented memory interface &amp; upscaling.</a:t>
+            </a:r>
           </a:p>
         </p:txBody>
       </p:sp>
@@ -4338,4 +5208,319 @@
     </a:ext>
   </a:extLst>
 </a:theme>
+</file>
+
+<file path=ppt/theme/theme2.xml><?xml version="1.0" encoding="utf-8"?>
+<a:theme xmlns:a="http://schemas.openxmlformats.org/drawingml/2006/main" name="Office Theme">
+  <a:themeElements>
+    <a:clrScheme name="Office">
+      <a:dk1>
+        <a:sysClr val="windowText" lastClr="000000"/>
+      </a:dk1>
+      <a:lt1>
+        <a:sysClr val="window" lastClr="FFFFFF"/>
+      </a:lt1>
+      <a:dk2>
+        <a:srgbClr val="0E2841"/>
+      </a:dk2>
+      <a:lt2>
+        <a:srgbClr val="E8E8E8"/>
+      </a:lt2>
+      <a:accent1>
+        <a:srgbClr val="156082"/>
+      </a:accent1>
+      <a:accent2>
+        <a:srgbClr val="E97132"/>
+      </a:accent2>
+      <a:accent3>
+        <a:srgbClr val="196B24"/>
+      </a:accent3>
+      <a:accent4>
+        <a:srgbClr val="0F9ED5"/>
+      </a:accent4>
+      <a:accent5>
+        <a:srgbClr val="A02B93"/>
+      </a:accent5>
+      <a:accent6>
+        <a:srgbClr val="4EA72E"/>
+      </a:accent6>
+      <a:hlink>
+        <a:srgbClr val="467886"/>
+      </a:hlink>
+      <a:folHlink>
+        <a:srgbClr val="96607D"/>
+      </a:folHlink>
+    </a:clrScheme>
+    <a:fontScheme name="Office">
+      <a:majorFont>
+        <a:latin typeface="Aptos Display" panose="02110004020202020204"/>
+        <a:ea typeface=""/>
+        <a:cs typeface=""/>
+        <a:font script="Jpan" typeface="游ゴシック Light"/>
+        <a:font script="Hang" typeface="맑은 고딕"/>
+        <a:font script="Hans" typeface="等线 Light"/>
+        <a:font script="Hant" typeface="新細明體"/>
+        <a:font script="Arab" typeface="Times New Roman"/>
+        <a:font script="Hebr" typeface="Times New Roman"/>
+        <a:font script="Thai" typeface="Angsana New"/>
+        <a:font script="Ethi" typeface="Nyala"/>
+        <a:font script="Beng" typeface="Vrinda"/>
+        <a:font script="Gujr" typeface="Shruti"/>
+        <a:font script="Khmr" typeface="MoolBoran"/>
+        <a:font script="Knda" typeface="Tunga"/>
+        <a:font script="Guru" typeface="Raavi"/>
+        <a:font script="Cans" typeface="Euphemia"/>
+        <a:font script="Cher" typeface="Plantagenet Cherokee"/>
+        <a:font script="Yiii" typeface="Microsoft Yi Baiti"/>
+        <a:font script="Tibt" typeface="Microsoft Himalaya"/>
+        <a:font script="Thaa" typeface="MV Boli"/>
+        <a:font script="Deva" typeface="Mangal"/>
+        <a:font script="Telu" typeface="Gautami"/>
+        <a:font script="Taml" typeface="Latha"/>
+        <a:font script="Syrc" typeface="Estrangelo Edessa"/>
+        <a:font script="Orya" typeface="Kalinga"/>
+        <a:font script="Mlym" typeface="Kartika"/>
+        <a:font script="Laoo" typeface="DokChampa"/>
+        <a:font script="Sinh" typeface="Iskoola Pota"/>
+        <a:font script="Mong" typeface="Mongolian Baiti"/>
+        <a:font script="Viet" typeface="Times New Roman"/>
+        <a:font script="Uigh" typeface="Microsoft Uighur"/>
+        <a:font script="Geor" typeface="Sylfaen"/>
+        <a:font script="Armn" typeface="Arial"/>
+        <a:font script="Bugi" typeface="Leelawadee UI"/>
+        <a:font script="Bopo" typeface="Microsoft JhengHei"/>
+        <a:font script="Java" typeface="Javanese Text"/>
+        <a:font script="Lisu" typeface="Segoe UI"/>
+        <a:font script="Mymr" typeface="Myanmar Text"/>
+        <a:font script="Nkoo" typeface="Ebrima"/>
+        <a:font script="Olck" typeface="Nirmala UI"/>
+        <a:font script="Osma" typeface="Ebrima"/>
+        <a:font script="Phag" typeface="Phagspa"/>
+        <a:font script="Syrn" typeface="Estrangelo Edessa"/>
+        <a:font script="Syrj" typeface="Estrangelo Edessa"/>
+        <a:font script="Syre" typeface="Estrangelo Edessa"/>
+        <a:font script="Sora" typeface="Nirmala UI"/>
+        <a:font script="Tale" typeface="Microsoft Tai Le"/>
+        <a:font script="Talu" typeface="Microsoft New Tai Lue"/>
+        <a:font script="Tfng" typeface="Ebrima"/>
+      </a:majorFont>
+      <a:minorFont>
+        <a:latin typeface="Aptos" panose="02110004020202020204"/>
+        <a:ea typeface=""/>
+        <a:cs typeface=""/>
+        <a:font script="Jpan" typeface="游ゴシック"/>
+        <a:font script="Hang" typeface="맑은 고딕"/>
+        <a:font script="Hans" typeface="等线"/>
+        <a:font script="Hant" typeface="新細明體"/>
+        <a:font script="Arab" typeface="Arial"/>
+        <a:font script="Hebr" typeface="Arial"/>
+        <a:font script="Thai" typeface="Cordia New"/>
+        <a:font script="Ethi" typeface="Nyala"/>
+        <a:font script="Beng" typeface="Vrinda"/>
+        <a:font script="Gujr" typeface="Shruti"/>
+        <a:font script="Khmr" typeface="DaunPenh"/>
+        <a:font script="Knda" typeface="Tunga"/>
+        <a:font script="Guru" typeface="Raavi"/>
+        <a:font script="Cans" typeface="Euphemia"/>
+        <a:font script="Cher" typeface="Plantagenet Cherokee"/>
+        <a:font script="Yiii" typeface="Microsoft Yi Baiti"/>
+        <a:font script="Tibt" typeface="Microsoft Himalaya"/>
+        <a:font script="Thaa" typeface="MV Boli"/>
+        <a:font script="Deva" typeface="Mangal"/>
+        <a:font script="Telu" typeface="Gautami"/>
+        <a:font script="Taml" typeface="Latha"/>
+        <a:font script="Syrc" typeface="Estrangelo Edessa"/>
+        <a:font script="Orya" typeface="Kalinga"/>
+        <a:font script="Mlym" typeface="Kartika"/>
+        <a:font script="Laoo" typeface="DokChampa"/>
+        <a:font script="Sinh" typeface="Iskoola Pota"/>
+        <a:font script="Mong" typeface="Mongolian Baiti"/>
+        <a:font script="Viet" typeface="Arial"/>
+        <a:font script="Uigh" typeface="Microsoft Uighur"/>
+        <a:font script="Geor" typeface="Sylfaen"/>
+        <a:font script="Armn" typeface="Arial"/>
+        <a:font script="Bugi" typeface="Leelawadee UI"/>
+        <a:font script="Bopo" typeface="Microsoft JhengHei"/>
+        <a:font script="Java" typeface="Javanese Text"/>
+        <a:font script="Lisu" typeface="Segoe UI"/>
+        <a:font script="Mymr" typeface="Myanmar Text"/>
+        <a:font script="Nkoo" typeface="Ebrima"/>
+        <a:font script="Olck" typeface="Nirmala UI"/>
+        <a:font script="Osma" typeface="Ebrima"/>
+        <a:font script="Phag" typeface="Phagspa"/>
+        <a:font script="Syrn" typeface="Estrangelo Edessa"/>
+        <a:font script="Syrj" typeface="Estrangelo Edessa"/>
+        <a:font script="Syre" typeface="Estrangelo Edessa"/>
+        <a:font script="Sora" typeface="Nirmala UI"/>
+        <a:font script="Tale" typeface="Microsoft Tai Le"/>
+        <a:font script="Talu" typeface="Microsoft New Tai Lue"/>
+        <a:font script="Tfng" typeface="Ebrima"/>
+      </a:minorFont>
+    </a:fontScheme>
+    <a:fmtScheme name="Office">
+      <a:fillStyleLst>
+        <a:solidFill>
+          <a:schemeClr val="phClr"/>
+        </a:solidFill>
+        <a:gradFill rotWithShape="1">
+          <a:gsLst>
+            <a:gs pos="0">
+              <a:schemeClr val="phClr">
+                <a:lumMod val="110000"/>
+                <a:satMod val="105000"/>
+                <a:tint val="67000"/>
+              </a:schemeClr>
+            </a:gs>
+            <a:gs pos="50000">
+              <a:schemeClr val="phClr">
+                <a:lumMod val="105000"/>
+                <a:satMod val="103000"/>
+                <a:tint val="73000"/>
+              </a:schemeClr>
+            </a:gs>
+            <a:gs pos="100000">
+              <a:schemeClr val="phClr">
+                <a:lumMod val="105000"/>
+                <a:satMod val="109000"/>
+                <a:tint val="81000"/>
+              </a:schemeClr>
+            </a:gs>
+          </a:gsLst>
+          <a:lin ang="5400000" scaled="0"/>
+        </a:gradFill>
+        <a:gradFill rotWithShape="1">
+          <a:gsLst>
+            <a:gs pos="0">
+              <a:schemeClr val="phClr">
+                <a:satMod val="103000"/>
+                <a:lumMod val="102000"/>
+                <a:tint val="94000"/>
+              </a:schemeClr>
+            </a:gs>
+            <a:gs pos="50000">
+              <a:schemeClr val="phClr">
+                <a:satMod val="110000"/>
+                <a:lumMod val="100000"/>
+                <a:shade val="100000"/>
+              </a:schemeClr>
+            </a:gs>
+            <a:gs pos="100000">
+              <a:schemeClr val="phClr">
+                <a:lumMod val="99000"/>
+                <a:satMod val="120000"/>
+                <a:shade val="78000"/>
+              </a:schemeClr>
+            </a:gs>
+          </a:gsLst>
+          <a:lin ang="5400000" scaled="0"/>
+        </a:gradFill>
+      </a:fillStyleLst>
+      <a:lnStyleLst>
+        <a:ln w="12700" cap="flat" cmpd="sng" algn="ctr">
+          <a:solidFill>
+            <a:schemeClr val="phClr"/>
+          </a:solidFill>
+          <a:prstDash val="solid"/>
+          <a:miter lim="800000"/>
+        </a:ln>
+        <a:ln w="19050" cap="flat" cmpd="sng" algn="ctr">
+          <a:solidFill>
+            <a:schemeClr val="phClr"/>
+          </a:solidFill>
+          <a:prstDash val="solid"/>
+          <a:miter lim="800000"/>
+        </a:ln>
+        <a:ln w="25400" cap="flat" cmpd="sng" algn="ctr">
+          <a:solidFill>
+            <a:schemeClr val="phClr"/>
+          </a:solidFill>
+          <a:prstDash val="solid"/>
+          <a:miter lim="800000"/>
+        </a:ln>
+      </a:lnStyleLst>
+      <a:effectStyleLst>
+        <a:effectStyle>
+          <a:effectLst/>
+        </a:effectStyle>
+        <a:effectStyle>
+          <a:effectLst/>
+        </a:effectStyle>
+        <a:effectStyle>
+          <a:effectLst>
+            <a:outerShdw blurRad="57150" dist="19050" dir="5400000" algn="ctr" rotWithShape="0">
+              <a:srgbClr val="000000">
+                <a:alpha val="63000"/>
+              </a:srgbClr>
+            </a:outerShdw>
+          </a:effectLst>
+        </a:effectStyle>
+      </a:effectStyleLst>
+      <a:bgFillStyleLst>
+        <a:solidFill>
+          <a:schemeClr val="phClr"/>
+        </a:solidFill>
+        <a:solidFill>
+          <a:schemeClr val="phClr">
+            <a:tint val="95000"/>
+            <a:satMod val="170000"/>
+          </a:schemeClr>
+        </a:solidFill>
+        <a:gradFill rotWithShape="1">
+          <a:gsLst>
+            <a:gs pos="0">
+              <a:schemeClr val="phClr">
+                <a:tint val="93000"/>
+                <a:satMod val="150000"/>
+                <a:shade val="98000"/>
+                <a:lumMod val="102000"/>
+              </a:schemeClr>
+            </a:gs>
+            <a:gs pos="50000">
+              <a:schemeClr val="phClr">
+                <a:tint val="98000"/>
+                <a:satMod val="130000"/>
+                <a:shade val="90000"/>
+                <a:lumMod val="103000"/>
+              </a:schemeClr>
+            </a:gs>
+            <a:gs pos="100000">
+              <a:schemeClr val="phClr">
+                <a:shade val="63000"/>
+                <a:satMod val="120000"/>
+              </a:schemeClr>
+            </a:gs>
+          </a:gsLst>
+          <a:lin ang="5400000" scaled="0"/>
+        </a:gradFill>
+      </a:bgFillStyleLst>
+    </a:fmtScheme>
+  </a:themeElements>
+  <a:objectDefaults>
+    <a:lnDef>
+      <a:spPr/>
+      <a:bodyPr/>
+      <a:lstStyle/>
+      <a:style>
+        <a:lnRef idx="2">
+          <a:schemeClr val="accent1"/>
+        </a:lnRef>
+        <a:fillRef idx="0">
+          <a:schemeClr val="accent1"/>
+        </a:fillRef>
+        <a:effectRef idx="1">
+          <a:schemeClr val="accent1"/>
+        </a:effectRef>
+        <a:fontRef idx="minor">
+          <a:schemeClr val="tx1"/>
+        </a:fontRef>
+      </a:style>
+    </a:lnDef>
+  </a:objectDefaults>
+  <a:extraClrSchemeLst/>
+  <a:extLst>
+    <a:ext uri="{05A4C25C-085E-4340-85A3-A5531E510DB2}">
+      <thm15:themeFamily xmlns:thm15="http://schemas.microsoft.com/office/thememl/2012/main" name="Office Theme" id="{2E142A2C-CD16-42D6-873A-C26D2A0506FA}" vid="{1BDDFF52-6CD6-40A5-AB3C-68EB2F1E4D0A}"/>
+    </a:ext>
+  </a:extLst>
+</a:theme>
 </file>
</xml_diff>

<commit_message>
Added a challenges slide
</commit_message>
<xml_diff>
--- a/bAGOLife.pptx
+++ b/bAGOLife.pptx
@@ -3896,16 +3896,10 @@
               <a:buNone/>
             </a:pPr>
             <a:r>
-              <a:rPr lang="en-GB">
-                <a:latin typeface="Comic Sans MS" panose="030F0702030302020204" pitchFamily="66" charset="0"/>
-              </a:rPr>
-              <a:t>Conway’s </a:t>
-            </a:r>
-            <a:r>
               <a:rPr lang="en-GB" dirty="0">
                 <a:latin typeface="Comic Sans MS" panose="030F0702030302020204" pitchFamily="66" charset="0"/>
               </a:rPr>
-              <a:t>Game of Life in an ASIC with a HDMI output would be cool</a:t>
+              <a:t>Conway’s Game of Life in an ASIC with a HDMI output would be cool</a:t>
             </a:r>
           </a:p>
         </p:txBody>
@@ -4610,11 +4604,12 @@
           <a:bodyPr/>
           <a:lstStyle/>
           <a:p>
-            <a:endParaRPr lang="en-GB" dirty="0">
-              <a:solidFill>
-                <a:srgbClr val="EC5E03"/>
-              </a:solidFill>
-            </a:endParaRPr>
+            <a:r>
+              <a:rPr lang="en-GB" dirty="0">
+                <a:latin typeface="Comic Sans MS" panose="030F0702030302020204" pitchFamily="66" charset="0"/>
+              </a:rPr>
+              <a:t>Challenges</a:t>
+            </a:r>
           </a:p>
         </p:txBody>
       </p:sp>
@@ -4634,12 +4629,98 @@
             <p:ph idx="1"/>
           </p:nvPr>
         </p:nvSpPr>
-        <p:spPr/>
-        <p:txBody>
-          <a:bodyPr/>
-          <a:lstStyle/>
-          <a:p>
-            <a:endParaRPr lang="en-GB"/>
+        <p:spPr>
+          <a:xfrm>
+            <a:off x="628650" y="1428750"/>
+            <a:ext cx="7886700" cy="5429249"/>
+          </a:xfrm>
+        </p:spPr>
+        <p:txBody>
+          <a:bodyPr>
+            <a:normAutofit/>
+          </a:bodyPr>
+          <a:lstStyle/>
+          <a:p>
+            <a:r>
+              <a:rPr lang="en-GB" dirty="0">
+                <a:latin typeface="Comic Sans MS" panose="030F0702030302020204" pitchFamily="66" charset="0"/>
+              </a:rPr>
+              <a:t>HDMI is hard…</a:t>
+            </a:r>
+          </a:p>
+          <a:p>
+            <a:endParaRPr lang="en-GB" dirty="0">
+              <a:latin typeface="Comic Sans MS" panose="030F0702030302020204" pitchFamily="66" charset="0"/>
+            </a:endParaRPr>
+          </a:p>
+          <a:p>
+            <a:pPr marL="0" indent="0">
+              <a:buNone/>
+            </a:pPr>
+            <a:endParaRPr lang="en-GB" dirty="0">
+              <a:latin typeface="Comic Sans MS" panose="030F0702030302020204" pitchFamily="66" charset="0"/>
+            </a:endParaRPr>
+          </a:p>
+          <a:p>
+            <a:pPr marL="0" indent="0">
+              <a:buNone/>
+            </a:pPr>
+            <a:endParaRPr lang="en-GB" dirty="0">
+              <a:latin typeface="Comic Sans MS" panose="030F0702030302020204" pitchFamily="66" charset="0"/>
+            </a:endParaRPr>
+          </a:p>
+          <a:p>
+            <a:pPr lvl="1"/>
+            <a:endParaRPr lang="en-GB" dirty="0">
+              <a:latin typeface="Comic Sans MS" panose="030F0702030302020204" pitchFamily="66" charset="0"/>
+            </a:endParaRPr>
+          </a:p>
+          <a:p>
+            <a:pPr lvl="1"/>
+            <a:endParaRPr lang="en-GB" dirty="0">
+              <a:latin typeface="Comic Sans MS" panose="030F0702030302020204" pitchFamily="66" charset="0"/>
+            </a:endParaRPr>
+          </a:p>
+          <a:p>
+            <a:pPr lvl="1"/>
+            <a:endParaRPr lang="en-GB" dirty="0">
+              <a:latin typeface="Comic Sans MS" panose="030F0702030302020204" pitchFamily="66" charset="0"/>
+            </a:endParaRPr>
+          </a:p>
+          <a:p>
+            <a:pPr lvl="1"/>
+            <a:r>
+              <a:rPr lang="en-GB" dirty="0">
+                <a:latin typeface="Comic Sans MS" panose="030F0702030302020204" pitchFamily="66" charset="0"/>
+              </a:rPr>
+              <a:t>125 MHz clock</a:t>
+            </a:r>
+          </a:p>
+          <a:p>
+            <a:pPr lvl="1"/>
+            <a:r>
+              <a:rPr lang="en-GB" dirty="0">
+                <a:latin typeface="Comic Sans MS" panose="030F0702030302020204" pitchFamily="66" charset="0"/>
+              </a:rPr>
+              <a:t>Double-data rate outputs</a:t>
+            </a:r>
+          </a:p>
+          <a:p>
+            <a:pPr lvl="1"/>
+            <a:r>
+              <a:rPr lang="en-GB" dirty="0">
+                <a:latin typeface="Comic Sans MS" panose="030F0702030302020204" pitchFamily="66" charset="0"/>
+              </a:rPr>
+              <a:t>By-5 clock division…</a:t>
+            </a:r>
+          </a:p>
+          <a:p>
+            <a:r>
+              <a:rPr lang="en-GB" dirty="0">
+                <a:latin typeface="Comic Sans MS" panose="030F0702030302020204" pitchFamily="66" charset="0"/>
+              </a:rPr>
+              <a:t>So we have some hacks</a:t>
+            </a:r>
           </a:p>
         </p:txBody>
       </p:sp>

</xml_diff>

<commit_message>
Added a shaders slide
</commit_message>
<xml_diff>
--- a/bAGOLife.pptx
+++ b/bAGOLife.pptx
@@ -5,7 +5,7 @@
     <p:sldMasterId id="2147483672" r:id="rId1"/>
   </p:sldMasterIdLst>
   <p:notesMasterIdLst>
-    <p:notesMasterId r:id="rId8"/>
+    <p:notesMasterId r:id="rId9"/>
   </p:notesMasterIdLst>
   <p:sldIdLst>
     <p:sldId id="256" r:id="rId2"/>
@@ -14,6 +14,7 @@
     <p:sldId id="259" r:id="rId5"/>
     <p:sldId id="260" r:id="rId6"/>
     <p:sldId id="261" r:id="rId7"/>
+    <p:sldId id="262" r:id="rId8"/>
   </p:sldIdLst>
   <p:sldSz cx="9144000" cy="6858000" type="screen4x3"/>
   <p:notesSz cx="6858000" cy="9144000"/>
@@ -4265,8 +4266,8 @@
         </p:nvSpPr>
         <p:spPr>
           <a:xfrm>
-            <a:off x="628650" y="1825624"/>
-            <a:ext cx="7886700" cy="4894489"/>
+            <a:off x="628650" y="1633539"/>
+            <a:ext cx="7886700" cy="5167309"/>
           </a:xfrm>
           <a:prstGeom prst="rect">
             <a:avLst/>
@@ -4479,6 +4480,11 @@
             </a:endParaRPr>
           </a:p>
           <a:p>
+            <a:endParaRPr lang="en-GB" dirty="0">
+              <a:latin typeface="Comic Sans MS" panose="030F0702030302020204" pitchFamily="66" charset="0"/>
+            </a:endParaRPr>
+          </a:p>
+          <a:p>
             <a:r>
               <a:rPr lang="en-GB" dirty="0">
                 <a:latin typeface="Comic Sans MS" panose="030F0702030302020204" pitchFamily="66" charset="0"/>
@@ -4813,10 +4819,17 @@
         </p:nvSpPr>
         <p:spPr/>
         <p:txBody>
-          <a:bodyPr/>
-          <a:lstStyle/>
-          <a:p>
-            <a:endParaRPr lang="en-GB"/>
+          <a:bodyPr>
+            <a:normAutofit/>
+          </a:bodyPr>
+          <a:lstStyle/>
+          <a:p>
+            <a:r>
+              <a:rPr lang="en-GB" sz="3600" dirty="0">
+                <a:latin typeface="Comic Sans MS" panose="030F0702030302020204" pitchFamily="66" charset="0"/>
+              </a:rPr>
+              <a:t>Converting Shaders is Also Hard</a:t>
+            </a:r>
           </a:p>
         </p:txBody>
       </p:sp>
@@ -4836,12 +4849,24 @@
             <p:ph idx="1"/>
           </p:nvPr>
         </p:nvSpPr>
-        <p:spPr/>
-        <p:txBody>
-          <a:bodyPr/>
-          <a:lstStyle/>
-          <a:p>
-            <a:endParaRPr lang="en-GB"/>
+        <p:spPr>
+          <a:xfrm>
+            <a:off x="628650" y="4933949"/>
+            <a:ext cx="7886700" cy="1243013"/>
+          </a:xfrm>
+        </p:spPr>
+        <p:txBody>
+          <a:bodyPr>
+            <a:normAutofit lnSpcReduction="10000"/>
+          </a:bodyPr>
+          <a:lstStyle/>
+          <a:p>
+            <a:r>
+              <a:rPr lang="en-GB" dirty="0">
+                <a:latin typeface="Comic Sans MS" panose="030F0702030302020204" pitchFamily="66" charset="0"/>
+              </a:rPr>
+              <a:t>What we see during design is different once we convert high-level floating point operations to integer ops for hardware.</a:t>
+            </a:r>
           </a:p>
         </p:txBody>
       </p:sp>
@@ -4878,31 +4903,6 @@
           <a:chExt cx="0" cy="0"/>
         </a:xfrm>
       </p:grpSpPr>
-      <p:sp>
-        <p:nvSpPr>
-          <p:cNvPr id="2" name="Title 1">
-            <a:extLst>
-              <a:ext uri="{FF2B5EF4-FFF2-40B4-BE49-F238E27FC236}">
-                <a16:creationId xmlns:a16="http://schemas.microsoft.com/office/drawing/2014/main" id="{4598397F-0A0B-BD34-261B-33458FBB1CA7}"/>
-              </a:ext>
-            </a:extLst>
-          </p:cNvPr>
-          <p:cNvSpPr>
-            <a:spLocks noGrp="1"/>
-          </p:cNvSpPr>
-          <p:nvPr>
-            <p:ph type="title"/>
-          </p:nvPr>
-        </p:nvSpPr>
-        <p:spPr/>
-        <p:txBody>
-          <a:bodyPr/>
-          <a:lstStyle/>
-          <a:p>
-            <a:endParaRPr lang="en-GB"/>
-          </a:p>
-        </p:txBody>
-      </p:sp>
       <p:pic>
         <p:nvPicPr>
           <p:cNvPr id="5" name="Content Placeholder 4" descr="A screenshot of a computer&#10;&#10;AI-generated content may be incorrect.">
@@ -4943,10 +4943,10 @@
       </p:pic>
       <p:sp>
         <p:nvSpPr>
-          <p:cNvPr id="3" name="Content Placeholder 2">
+          <p:cNvPr id="7" name="Title 6">
             <a:extLst>
               <a:ext uri="{FF2B5EF4-FFF2-40B4-BE49-F238E27FC236}">
-                <a16:creationId xmlns:a16="http://schemas.microsoft.com/office/drawing/2014/main" id="{51E84F66-5873-E637-2B48-36EC297769EB}"/>
+                <a16:creationId xmlns:a16="http://schemas.microsoft.com/office/drawing/2014/main" id="{331F5046-0FEE-1E1D-4880-3766F2150F58}"/>
               </a:ext>
             </a:extLst>
           </p:cNvPr>
@@ -4954,7 +4954,7 @@
             <a:spLocks noGrp="1"/>
           </p:cNvSpPr>
           <p:nvPr>
-            <p:ph idx="1"/>
+            <p:ph type="ctrTitle"/>
           </p:nvPr>
         </p:nvSpPr>
         <p:spPr/>
@@ -4962,7 +4962,12 @@
           <a:bodyPr/>
           <a:lstStyle/>
           <a:p>
-            <a:endParaRPr lang="en-GB" dirty="0"/>
+            <a:r>
+              <a:rPr lang="en-GB" dirty="0">
+                <a:latin typeface="Comic Sans MS" panose="030F0702030302020204" pitchFamily="66" charset="0"/>
+              </a:rPr>
+              <a:t>Any Questions?</a:t>
+            </a:r>
           </a:p>
         </p:txBody>
       </p:sp>
@@ -4979,6 +4984,86 @@
   <p:transition>
     <p:fade/>
   </p:transition>
+</p:sld>
+</file>
+
+<file path=ppt/slides/slide7.xml><?xml version="1.0" encoding="utf-8"?>
+<p:sld xmlns:a="http://schemas.openxmlformats.org/drawingml/2006/main" xmlns:r="http://schemas.openxmlformats.org/officeDocument/2006/relationships" xmlns:p="http://schemas.openxmlformats.org/presentationml/2006/main">
+  <p:cSld>
+    <p:spTree>
+      <p:nvGrpSpPr>
+        <p:cNvPr id="1" name=""/>
+        <p:cNvGrpSpPr/>
+        <p:nvPr/>
+      </p:nvGrpSpPr>
+      <p:grpSpPr>
+        <a:xfrm>
+          <a:off x="0" y="0"/>
+          <a:ext cx="0" cy="0"/>
+          <a:chOff x="0" y="0"/>
+          <a:chExt cx="0" cy="0"/>
+        </a:xfrm>
+      </p:grpSpPr>
+      <p:sp>
+        <p:nvSpPr>
+          <p:cNvPr id="2" name="Title 1">
+            <a:extLst>
+              <a:ext uri="{FF2B5EF4-FFF2-40B4-BE49-F238E27FC236}">
+                <a16:creationId xmlns:a16="http://schemas.microsoft.com/office/drawing/2014/main" id="{42D57E31-EB3F-8E63-16A7-4E9ECA1D4AAA}"/>
+              </a:ext>
+            </a:extLst>
+          </p:cNvPr>
+          <p:cNvSpPr>
+            <a:spLocks noGrp="1"/>
+          </p:cNvSpPr>
+          <p:nvPr>
+            <p:ph type="title"/>
+          </p:nvPr>
+        </p:nvSpPr>
+        <p:spPr/>
+        <p:txBody>
+          <a:bodyPr/>
+          <a:lstStyle/>
+          <a:p>
+            <a:endParaRPr lang="en-GB"/>
+          </a:p>
+        </p:txBody>
+      </p:sp>
+      <p:sp>
+        <p:nvSpPr>
+          <p:cNvPr id="3" name="Content Placeholder 2">
+            <a:extLst>
+              <a:ext uri="{FF2B5EF4-FFF2-40B4-BE49-F238E27FC236}">
+                <a16:creationId xmlns:a16="http://schemas.microsoft.com/office/drawing/2014/main" id="{9FD824D2-A7FA-A6D2-D840-1D6A45225737}"/>
+              </a:ext>
+            </a:extLst>
+          </p:cNvPr>
+          <p:cNvSpPr>
+            <a:spLocks noGrp="1"/>
+          </p:cNvSpPr>
+          <p:nvPr>
+            <p:ph idx="1"/>
+          </p:nvPr>
+        </p:nvSpPr>
+        <p:spPr/>
+        <p:txBody>
+          <a:bodyPr/>
+          <a:lstStyle/>
+          <a:p>
+            <a:endParaRPr lang="en-GB"/>
+          </a:p>
+        </p:txBody>
+      </p:sp>
+    </p:spTree>
+    <p:extLst>
+      <p:ext uri="{BB962C8B-B14F-4D97-AF65-F5344CB8AC3E}">
+        <p14:creationId xmlns:p14="http://schemas.microsoft.com/office/powerpoint/2010/main" val="578251865"/>
+      </p:ext>
+    </p:extLst>
+  </p:cSld>
+  <p:clrMapOvr>
+    <a:masterClrMapping/>
+  </p:clrMapOvr>
 </p:sld>
 </file>
 

</xml_diff>